<commit_message>
Updating the feature page Issue 258. Revised edition of the feature page
</commit_message>
<xml_diff>
--- a/doc/mockups/features-screenshots/feature1-addCourse.pptx
+++ b/doc/mockups/features-screenshots/feature1-addCourse.pptx
@@ -3076,26 +3076,34 @@
       </p:grpSpPr>
       <p:pic>
         <p:nvPicPr>
-          <p:cNvPr id="28" name="Picture 27" descr="teacher.png"/>
+          <p:cNvPr id="1027" name="Picture 3"/>
           <p:cNvPicPr>
-            <a:picLocks noChangeAspect="1"/>
+            <a:picLocks noChangeAspect="1" noChangeArrowheads="1"/>
           </p:cNvPicPr>
           <p:nvPr/>
         </p:nvPicPr>
         <p:blipFill>
           <a:blip r:embed="rId2" cstate="print"/>
+          <a:srcRect/>
           <a:stretch>
             <a:fillRect/>
           </a:stretch>
         </p:blipFill>
-        <p:spPr>
+        <p:spPr bwMode="auto">
           <a:xfrm>
-            <a:off x="360412" y="648246"/>
-            <a:ext cx="504056" cy="701295"/>
+            <a:off x="2520652" y="463206"/>
+            <a:ext cx="5040559" cy="1481184"/>
           </a:xfrm>
           <a:prstGeom prst="rect">
             <a:avLst/>
           </a:prstGeom>
+          <a:noFill/>
+          <a:ln w="9525">
+            <a:noFill/>
+            <a:miter lim="800000"/>
+            <a:headEnd/>
+            <a:tailEnd/>
+          </a:ln>
         </p:spPr>
       </p:pic>
       <p:cxnSp>
@@ -3202,38 +3210,6 @@
           </a:p>
         </p:txBody>
       </p:sp>
-      <p:pic>
-        <p:nvPicPr>
-          <p:cNvPr id="32" name="Picture 2"/>
-          <p:cNvPicPr>
-            <a:picLocks noChangeAspect="1" noChangeArrowheads="1"/>
-          </p:cNvPicPr>
-          <p:nvPr/>
-        </p:nvPicPr>
-        <p:blipFill>
-          <a:blip r:embed="rId3" cstate="print"/>
-          <a:srcRect/>
-          <a:stretch>
-            <a:fillRect/>
-          </a:stretch>
-        </p:blipFill>
-        <p:spPr bwMode="auto">
-          <a:xfrm>
-            <a:off x="2520652" y="578693"/>
-            <a:ext cx="5067300" cy="1509713"/>
-          </a:xfrm>
-          <a:prstGeom prst="rect">
-            <a:avLst/>
-          </a:prstGeom>
-          <a:noFill/>
-          <a:ln w="9525">
-            <a:noFill/>
-            <a:miter lim="800000"/>
-            <a:headEnd/>
-            <a:tailEnd/>
-          </a:ln>
-        </p:spPr>
-      </p:pic>
       <p:sp>
         <p:nvSpPr>
           <p:cNvPr id="33" name="Rectangular Callout 32"/>
@@ -3337,6 +3313,32 @@
           </a:p>
         </p:txBody>
       </p:sp>
+      <p:pic>
+        <p:nvPicPr>
+          <p:cNvPr id="9" name="Picture 8" descr="C:\Users\dcsdcr\AppData\Local\Microsoft\Windows\Temporary Internet Files\Content.IE5\8EW2YN38\MC900432621[1].png"/>
+          <p:cNvPicPr>
+            <a:picLocks noChangeAspect="1" noChangeArrowheads="1"/>
+          </p:cNvPicPr>
+          <p:nvPr/>
+        </p:nvPicPr>
+        <p:blipFill>
+          <a:blip r:embed="rId3" cstate="print"/>
+          <a:srcRect/>
+          <a:stretch>
+            <a:fillRect/>
+          </a:stretch>
+        </p:blipFill>
+        <p:spPr bwMode="auto">
+          <a:xfrm flipH="1">
+            <a:off x="297213" y="657055"/>
+            <a:ext cx="711271" cy="711271"/>
+          </a:xfrm>
+          <a:prstGeom prst="rect">
+            <a:avLst/>
+          </a:prstGeom>
+          <a:noFill/>
+        </p:spPr>
+      </p:pic>
     </p:spTree>
   </p:cSld>
   <p:clrMapOvr>

</xml_diff>

<commit_message>
Starting Issue686[Update Features.html to match look and feel of the home page] Update Issue 686 Updated images. Resaved "homepage image.pptx" because it contained a restricted font.
</commit_message>
<xml_diff>
--- a/doc/mockups/features-screenshots/feature1-addCourse.pptx
+++ b/doc/mockups/features-screenshots/feature1-addCourse.pptx
@@ -304,7 +304,7 @@
             <a:fld id="{B0544CA6-0BFF-4F49-885A-88A3CCAE5331}" type="datetimeFigureOut">
               <a:rPr lang="en-SG" smtClean="0"/>
               <a:pPr/>
-              <a:t>1/8/2012</a:t>
+              <a:t>20/3/2013</a:t>
             </a:fld>
             <a:endParaRPr lang="en-SG"/>
           </a:p>
@@ -471,7 +471,7 @@
             <a:fld id="{B0544CA6-0BFF-4F49-885A-88A3CCAE5331}" type="datetimeFigureOut">
               <a:rPr lang="en-SG" smtClean="0"/>
               <a:pPr/>
-              <a:t>1/8/2012</a:t>
+              <a:t>20/3/2013</a:t>
             </a:fld>
             <a:endParaRPr lang="en-SG"/>
           </a:p>
@@ -648,7 +648,7 @@
             <a:fld id="{B0544CA6-0BFF-4F49-885A-88A3CCAE5331}" type="datetimeFigureOut">
               <a:rPr lang="en-SG" smtClean="0"/>
               <a:pPr/>
-              <a:t>1/8/2012</a:t>
+              <a:t>20/3/2013</a:t>
             </a:fld>
             <a:endParaRPr lang="en-SG"/>
           </a:p>
@@ -815,7 +815,7 @@
             <a:fld id="{B0544CA6-0BFF-4F49-885A-88A3CCAE5331}" type="datetimeFigureOut">
               <a:rPr lang="en-SG" smtClean="0"/>
               <a:pPr/>
-              <a:t>1/8/2012</a:t>
+              <a:t>20/3/2013</a:t>
             </a:fld>
             <a:endParaRPr lang="en-SG"/>
           </a:p>
@@ -1058,7 +1058,7 @@
             <a:fld id="{B0544CA6-0BFF-4F49-885A-88A3CCAE5331}" type="datetimeFigureOut">
               <a:rPr lang="en-SG" smtClean="0"/>
               <a:pPr/>
-              <a:t>1/8/2012</a:t>
+              <a:t>20/3/2013</a:t>
             </a:fld>
             <a:endParaRPr lang="en-SG"/>
           </a:p>
@@ -1343,7 +1343,7 @@
             <a:fld id="{B0544CA6-0BFF-4F49-885A-88A3CCAE5331}" type="datetimeFigureOut">
               <a:rPr lang="en-SG" smtClean="0"/>
               <a:pPr/>
-              <a:t>1/8/2012</a:t>
+              <a:t>20/3/2013</a:t>
             </a:fld>
             <a:endParaRPr lang="en-SG"/>
           </a:p>
@@ -1762,7 +1762,7 @@
             <a:fld id="{B0544CA6-0BFF-4F49-885A-88A3CCAE5331}" type="datetimeFigureOut">
               <a:rPr lang="en-SG" smtClean="0"/>
               <a:pPr/>
-              <a:t>1/8/2012</a:t>
+              <a:t>20/3/2013</a:t>
             </a:fld>
             <a:endParaRPr lang="en-SG"/>
           </a:p>
@@ -1877,7 +1877,7 @@
             <a:fld id="{B0544CA6-0BFF-4F49-885A-88A3CCAE5331}" type="datetimeFigureOut">
               <a:rPr lang="en-SG" smtClean="0"/>
               <a:pPr/>
-              <a:t>1/8/2012</a:t>
+              <a:t>20/3/2013</a:t>
             </a:fld>
             <a:endParaRPr lang="en-SG"/>
           </a:p>
@@ -1969,7 +1969,7 @@
             <a:fld id="{B0544CA6-0BFF-4F49-885A-88A3CCAE5331}" type="datetimeFigureOut">
               <a:rPr lang="en-SG" smtClean="0"/>
               <a:pPr/>
-              <a:t>1/8/2012</a:t>
+              <a:t>20/3/2013</a:t>
             </a:fld>
             <a:endParaRPr lang="en-SG"/>
           </a:p>
@@ -2243,7 +2243,7 @@
             <a:fld id="{B0544CA6-0BFF-4F49-885A-88A3CCAE5331}" type="datetimeFigureOut">
               <a:rPr lang="en-SG" smtClean="0"/>
               <a:pPr/>
-              <a:t>1/8/2012</a:t>
+              <a:t>20/3/2013</a:t>
             </a:fld>
             <a:endParaRPr lang="en-SG"/>
           </a:p>
@@ -2493,7 +2493,7 @@
             <a:fld id="{B0544CA6-0BFF-4F49-885A-88A3CCAE5331}" type="datetimeFigureOut">
               <a:rPr lang="en-SG" smtClean="0"/>
               <a:pPr/>
-              <a:t>1/8/2012</a:t>
+              <a:t>20/3/2013</a:t>
             </a:fld>
             <a:endParaRPr lang="en-SG"/>
           </a:p>
@@ -2703,7 +2703,7 @@
             <a:fld id="{B0544CA6-0BFF-4F49-885A-88A3CCAE5331}" type="datetimeFigureOut">
               <a:rPr lang="en-SG" smtClean="0"/>
               <a:pPr/>
-              <a:t>1/8/2012</a:t>
+              <a:t>20/3/2013</a:t>
             </a:fld>
             <a:endParaRPr lang="en-SG"/>
           </a:p>
@@ -3313,32 +3313,377 @@
           </a:p>
         </p:txBody>
       </p:sp>
-      <p:pic>
-        <p:nvPicPr>
-          <p:cNvPr id="9" name="Picture 8" descr="C:\Users\dcsdcr\AppData\Local\Microsoft\Windows\Temporary Internet Files\Content.IE5\8EW2YN38\MC900432621[1].png"/>
-          <p:cNvPicPr>
-            <a:picLocks noChangeAspect="1" noChangeArrowheads="1"/>
-          </p:cNvPicPr>
+      <p:grpSp>
+        <p:nvGrpSpPr>
+          <p:cNvPr id="10" name="Group 9"/>
+          <p:cNvGrpSpPr>
+            <a:grpSpLocks noChangeAspect="1"/>
+          </p:cNvGrpSpPr>
           <p:nvPr/>
-        </p:nvPicPr>
-        <p:blipFill>
-          <a:blip r:embed="rId3" cstate="print"/>
-          <a:srcRect/>
-          <a:stretch>
-            <a:fillRect/>
-          </a:stretch>
-        </p:blipFill>
-        <p:spPr bwMode="auto">
-          <a:xfrm flipH="1">
-            <a:off x="297213" y="657055"/>
-            <a:ext cx="711271" cy="711271"/>
+        </p:nvGrpSpPr>
+        <p:grpSpPr>
+          <a:xfrm>
+            <a:off x="432420" y="670818"/>
+            <a:ext cx="364763" cy="635048"/>
+            <a:chOff x="638861" y="309422"/>
+            <a:chExt cx="298983" cy="520531"/>
           </a:xfrm>
-          <a:prstGeom prst="rect">
-            <a:avLst/>
-          </a:prstGeom>
-          <a:noFill/>
-        </p:spPr>
-      </p:pic>
+        </p:grpSpPr>
+        <p:sp>
+          <p:nvSpPr>
+            <p:cNvPr id="11" name="Flowchart: Connector 10"/>
+            <p:cNvSpPr/>
+            <p:nvPr/>
+          </p:nvSpPr>
+          <p:spPr>
+            <a:xfrm>
+              <a:off x="678021" y="309422"/>
+              <a:ext cx="220662" cy="220662"/>
+            </a:xfrm>
+            <a:prstGeom prst="flowChartConnector">
+              <a:avLst/>
+            </a:prstGeom>
+            <a:solidFill>
+              <a:schemeClr val="bg1"/>
+            </a:solidFill>
+          </p:spPr>
+          <p:style>
+            <a:lnRef idx="2">
+              <a:schemeClr val="accent1">
+                <a:shade val="50000"/>
+              </a:schemeClr>
+            </a:lnRef>
+            <a:fillRef idx="1">
+              <a:schemeClr val="accent1"/>
+            </a:fillRef>
+            <a:effectRef idx="0">
+              <a:schemeClr val="accent1"/>
+            </a:effectRef>
+            <a:fontRef idx="minor">
+              <a:schemeClr val="lt1"/>
+            </a:fontRef>
+          </p:style>
+          <p:txBody>
+            <a:bodyPr rtlCol="0" anchor="ctr"/>
+            <a:lstStyle/>
+            <a:p>
+              <a:pPr algn="ctr"/>
+              <a:endParaRPr lang="en-SG"/>
+            </a:p>
+          </p:txBody>
+        </p:sp>
+        <p:grpSp>
+          <p:nvGrpSpPr>
+            <p:cNvPr id="12" name="Group 11"/>
+            <p:cNvGrpSpPr/>
+            <p:nvPr/>
+          </p:nvGrpSpPr>
+          <p:grpSpPr>
+            <a:xfrm>
+              <a:off x="638861" y="549600"/>
+              <a:ext cx="298983" cy="280353"/>
+              <a:chOff x="638861" y="549600"/>
+              <a:chExt cx="298983" cy="280353"/>
+            </a:xfrm>
+          </p:grpSpPr>
+          <p:sp>
+            <p:nvSpPr>
+              <p:cNvPr id="15" name="Flowchart: Delay 14"/>
+              <p:cNvSpPr/>
+              <p:nvPr/>
+            </p:nvSpPr>
+            <p:spPr>
+              <a:xfrm rot="16200000">
+                <a:off x="648176" y="540285"/>
+                <a:ext cx="280353" cy="298983"/>
+              </a:xfrm>
+              <a:prstGeom prst="flowChartDelay">
+                <a:avLst/>
+              </a:prstGeom>
+              <a:solidFill>
+                <a:schemeClr val="bg1"/>
+              </a:solidFill>
+            </p:spPr>
+            <p:style>
+              <a:lnRef idx="2">
+                <a:schemeClr val="accent1">
+                  <a:shade val="50000"/>
+                </a:schemeClr>
+              </a:lnRef>
+              <a:fillRef idx="1">
+                <a:schemeClr val="accent1"/>
+              </a:fillRef>
+              <a:effectRef idx="0">
+                <a:schemeClr val="accent1"/>
+              </a:effectRef>
+              <a:fontRef idx="minor">
+                <a:schemeClr val="lt1"/>
+              </a:fontRef>
+            </p:style>
+            <p:txBody>
+              <a:bodyPr rtlCol="0" anchor="ctr"/>
+              <a:lstStyle/>
+              <a:p>
+                <a:pPr algn="ctr"/>
+                <a:endParaRPr lang="en-SG"/>
+              </a:p>
+            </p:txBody>
+          </p:sp>
+          <p:sp>
+            <p:nvSpPr>
+              <p:cNvPr id="16" name="Freeform 15"/>
+              <p:cNvSpPr/>
+              <p:nvPr/>
+            </p:nvSpPr>
+            <p:spPr>
+              <a:xfrm>
+                <a:off x="737215" y="552954"/>
+                <a:ext cx="102393" cy="235744"/>
+              </a:xfrm>
+              <a:custGeom>
+                <a:avLst/>
+                <a:gdLst>
+                  <a:gd name="connsiteX0" fmla="*/ 47625 w 102393"/>
+                  <a:gd name="connsiteY0" fmla="*/ 0 h 235744"/>
+                  <a:gd name="connsiteX1" fmla="*/ 0 w 102393"/>
+                  <a:gd name="connsiteY1" fmla="*/ 185738 h 235744"/>
+                  <a:gd name="connsiteX2" fmla="*/ 57150 w 102393"/>
+                  <a:gd name="connsiteY2" fmla="*/ 235744 h 235744"/>
+                  <a:gd name="connsiteX3" fmla="*/ 102393 w 102393"/>
+                  <a:gd name="connsiteY3" fmla="*/ 171450 h 235744"/>
+                  <a:gd name="connsiteX4" fmla="*/ 47625 w 102393"/>
+                  <a:gd name="connsiteY4" fmla="*/ 0 h 235744"/>
+                </a:gdLst>
+                <a:ahLst/>
+                <a:cxnLst>
+                  <a:cxn ang="0">
+                    <a:pos x="connsiteX0" y="connsiteY0"/>
+                  </a:cxn>
+                  <a:cxn ang="0">
+                    <a:pos x="connsiteX1" y="connsiteY1"/>
+                  </a:cxn>
+                  <a:cxn ang="0">
+                    <a:pos x="connsiteX2" y="connsiteY2"/>
+                  </a:cxn>
+                  <a:cxn ang="0">
+                    <a:pos x="connsiteX3" y="connsiteY3"/>
+                  </a:cxn>
+                  <a:cxn ang="0">
+                    <a:pos x="connsiteX4" y="connsiteY4"/>
+                  </a:cxn>
+                </a:cxnLst>
+                <a:rect l="l" t="t" r="r" b="b"/>
+                <a:pathLst>
+                  <a:path w="102393" h="235744">
+                    <a:moveTo>
+                      <a:pt x="47625" y="0"/>
+                    </a:moveTo>
+                    <a:lnTo>
+                      <a:pt x="0" y="185738"/>
+                    </a:lnTo>
+                    <a:lnTo>
+                      <a:pt x="57150" y="235744"/>
+                    </a:lnTo>
+                    <a:lnTo>
+                      <a:pt x="102393" y="171450"/>
+                    </a:lnTo>
+                    <a:lnTo>
+                      <a:pt x="47625" y="0"/>
+                    </a:lnTo>
+                    <a:close/>
+                  </a:path>
+                </a:pathLst>
+              </a:custGeom>
+              <a:solidFill>
+                <a:schemeClr val="bg1"/>
+              </a:solidFill>
+            </p:spPr>
+            <p:style>
+              <a:lnRef idx="2">
+                <a:schemeClr val="accent1">
+                  <a:shade val="50000"/>
+                </a:schemeClr>
+              </a:lnRef>
+              <a:fillRef idx="1">
+                <a:schemeClr val="accent1"/>
+              </a:fillRef>
+              <a:effectRef idx="0">
+                <a:schemeClr val="accent1"/>
+              </a:effectRef>
+              <a:fontRef idx="minor">
+                <a:schemeClr val="lt1"/>
+              </a:fontRef>
+            </p:style>
+            <p:txBody>
+              <a:bodyPr rtlCol="0" anchor="ctr"/>
+              <a:lstStyle/>
+              <a:p>
+                <a:pPr algn="ctr"/>
+                <a:endParaRPr lang="en-SG"/>
+              </a:p>
+            </p:txBody>
+          </p:sp>
+        </p:grpSp>
+        <p:sp>
+          <p:nvSpPr>
+            <p:cNvPr id="13" name="Freeform 12"/>
+            <p:cNvSpPr/>
+            <p:nvPr/>
+          </p:nvSpPr>
+          <p:spPr>
+            <a:xfrm>
+              <a:off x="882472" y="469611"/>
+              <a:ext cx="50006" cy="19050"/>
+            </a:xfrm>
+            <a:custGeom>
+              <a:avLst/>
+              <a:gdLst>
+                <a:gd name="connsiteX0" fmla="*/ 0 w 50006"/>
+                <a:gd name="connsiteY0" fmla="*/ 0 h 19050"/>
+                <a:gd name="connsiteX1" fmla="*/ 0 w 50006"/>
+                <a:gd name="connsiteY1" fmla="*/ 0 h 19050"/>
+                <a:gd name="connsiteX2" fmla="*/ 21431 w 50006"/>
+                <a:gd name="connsiteY2" fmla="*/ 4762 h 19050"/>
+                <a:gd name="connsiteX3" fmla="*/ 28575 w 50006"/>
+                <a:gd name="connsiteY3" fmla="*/ 9525 h 19050"/>
+                <a:gd name="connsiteX4" fmla="*/ 38100 w 50006"/>
+                <a:gd name="connsiteY4" fmla="*/ 14287 h 19050"/>
+                <a:gd name="connsiteX5" fmla="*/ 50006 w 50006"/>
+                <a:gd name="connsiteY5" fmla="*/ 19050 h 19050"/>
+              </a:gdLst>
+              <a:ahLst/>
+              <a:cxnLst>
+                <a:cxn ang="0">
+                  <a:pos x="connsiteX0" y="connsiteY0"/>
+                </a:cxn>
+                <a:cxn ang="0">
+                  <a:pos x="connsiteX1" y="connsiteY1"/>
+                </a:cxn>
+                <a:cxn ang="0">
+                  <a:pos x="connsiteX2" y="connsiteY2"/>
+                </a:cxn>
+                <a:cxn ang="0">
+                  <a:pos x="connsiteX3" y="connsiteY3"/>
+                </a:cxn>
+                <a:cxn ang="0">
+                  <a:pos x="connsiteX4" y="connsiteY4"/>
+                </a:cxn>
+                <a:cxn ang="0">
+                  <a:pos x="connsiteX5" y="connsiteY5"/>
+                </a:cxn>
+              </a:cxnLst>
+              <a:rect l="l" t="t" r="r" b="b"/>
+              <a:pathLst>
+                <a:path w="50006" h="19050">
+                  <a:moveTo>
+                    <a:pt x="0" y="0"/>
+                  </a:moveTo>
+                  <a:lnTo>
+                    <a:pt x="0" y="0"/>
+                  </a:lnTo>
+                  <a:cubicBezTo>
+                    <a:pt x="7144" y="1587"/>
+                    <a:pt x="14489" y="2448"/>
+                    <a:pt x="21431" y="4762"/>
+                  </a:cubicBezTo>
+                  <a:cubicBezTo>
+                    <a:pt x="24146" y="5667"/>
+                    <a:pt x="26090" y="8105"/>
+                    <a:pt x="28575" y="9525"/>
+                  </a:cubicBezTo>
+                  <a:cubicBezTo>
+                    <a:pt x="31657" y="11286"/>
+                    <a:pt x="34837" y="12889"/>
+                    <a:pt x="38100" y="14287"/>
+                  </a:cubicBezTo>
+                  <a:cubicBezTo>
+                    <a:pt x="58672" y="23103"/>
+                    <a:pt x="34691" y="11391"/>
+                    <a:pt x="50006" y="19050"/>
+                  </a:cubicBezTo>
+                </a:path>
+              </a:pathLst>
+            </a:custGeom>
+            <a:solidFill>
+              <a:schemeClr val="bg1"/>
+            </a:solidFill>
+          </p:spPr>
+          <p:style>
+            <a:lnRef idx="2">
+              <a:schemeClr val="accent1">
+                <a:shade val="50000"/>
+              </a:schemeClr>
+            </a:lnRef>
+            <a:fillRef idx="1">
+              <a:schemeClr val="accent1"/>
+            </a:fillRef>
+            <a:effectRef idx="0">
+              <a:schemeClr val="accent1"/>
+            </a:effectRef>
+            <a:fontRef idx="minor">
+              <a:schemeClr val="lt1"/>
+            </a:fontRef>
+          </p:style>
+          <p:txBody>
+            <a:bodyPr rtlCol="0" anchor="ctr"/>
+            <a:lstStyle/>
+            <a:p>
+              <a:pPr algn="ctr"/>
+              <a:endParaRPr lang="en-SG"/>
+            </a:p>
+          </p:txBody>
+        </p:sp>
+        <p:sp>
+          <p:nvSpPr>
+            <p:cNvPr id="14" name="Flowchart: Connector 13"/>
+            <p:cNvSpPr/>
+            <p:nvPr/>
+          </p:nvSpPr>
+          <p:spPr>
+            <a:xfrm>
+              <a:off x="800257" y="354516"/>
+              <a:ext cx="45719" cy="45719"/>
+            </a:xfrm>
+            <a:prstGeom prst="flowChartConnector">
+              <a:avLst/>
+            </a:prstGeom>
+            <a:solidFill>
+              <a:schemeClr val="bg1"/>
+            </a:solidFill>
+            <a:ln>
+              <a:solidFill>
+                <a:schemeClr val="accent1">
+                  <a:lumMod val="75000"/>
+                </a:schemeClr>
+              </a:solidFill>
+            </a:ln>
+          </p:spPr>
+          <p:style>
+            <a:lnRef idx="2">
+              <a:schemeClr val="accent1">
+                <a:shade val="50000"/>
+              </a:schemeClr>
+            </a:lnRef>
+            <a:fillRef idx="1">
+              <a:schemeClr val="accent1"/>
+            </a:fillRef>
+            <a:effectRef idx="0">
+              <a:schemeClr val="accent1"/>
+            </a:effectRef>
+            <a:fontRef idx="minor">
+              <a:schemeClr val="lt1"/>
+            </a:fontRef>
+          </p:style>
+          <p:txBody>
+            <a:bodyPr rtlCol="0" anchor="ctr"/>
+            <a:lstStyle/>
+            <a:p>
+              <a:pPr algn="ctr"/>
+              <a:endParaRPr lang="en-SG"/>
+            </a:p>
+          </p:txBody>
+        </p:sp>
+      </p:grpSp>
     </p:spTree>
   </p:cSld>
   <p:clrMapOvr>

</xml_diff>

<commit_message>
Continuing Issue686[Update Features.html to match look and feel of the home page] Update Issue 686 Some more tweaks.
</commit_message>
<xml_diff>
--- a/doc/mockups/features-screenshots/feature1-addCourse.pptx
+++ b/doc/mockups/features-screenshots/feature1-addCourse.pptx
@@ -111,15 +111,6 @@
 <p:cmAuthorLst xmlns:a="http://schemas.openxmlformats.org/drawingml/2006/main" xmlns:r="http://schemas.openxmlformats.org/officeDocument/2006/relationships" xmlns:p="http://schemas.openxmlformats.org/presentationml/2006/main">
   <p:cmAuthor id="0" name="Damith C. Rajapakse" initials="DCR" lastIdx="16" clrIdx="0"/>
 </p:cmAuthorLst>
-</file>
-
-<file path=ppt/comments/comment1.xml><?xml version="1.0" encoding="utf-8"?>
-<p:cmLst xmlns:a="http://schemas.openxmlformats.org/drawingml/2006/main" xmlns:r="http://schemas.openxmlformats.org/officeDocument/2006/relationships" xmlns:p="http://schemas.openxmlformats.org/presentationml/2006/main">
-  <p:cm authorId="0" dt="2012-08-01T10:32:11.577" idx="1">
-    <p:pos x="1352" y="996"/>
-    <p:text>Button not visible. Not aligned with anything.</p:text>
-  </p:cm>
-</p:cmLst>
 </file>
 
 <file path=ppt/slideLayouts/slideLayout1.xml><?xml version="1.0" encoding="utf-8"?>

</xml_diff>

<commit_message>
Synching Issue690 [Sorting doesn't work for some columns in evaluation summary reports]
</commit_message>
<xml_diff>
--- a/doc/mockups/features-screenshots/feature1-addCourse.pptx
+++ b/doc/mockups/features-screenshots/feature1-addCourse.pptx
@@ -113,15 +113,6 @@
 </p:cmAuthorLst>
 </file>
 
-<file path=ppt/comments/comment1.xml><?xml version="1.0" encoding="utf-8"?>
-<p:cmLst xmlns:a="http://schemas.openxmlformats.org/drawingml/2006/main" xmlns:r="http://schemas.openxmlformats.org/officeDocument/2006/relationships" xmlns:p="http://schemas.openxmlformats.org/presentationml/2006/main">
-  <p:cm authorId="0" dt="2012-08-01T10:32:11.577" idx="1">
-    <p:pos x="1352" y="996"/>
-    <p:text>Button not visible. Not aligned with anything.</p:text>
-  </p:cm>
-</p:cmLst>
-</file>
-
 <file path=ppt/slideLayouts/slideLayout1.xml><?xml version="1.0" encoding="utf-8"?>
 <p:sldLayout xmlns:a="http://schemas.openxmlformats.org/drawingml/2006/main" xmlns:r="http://schemas.openxmlformats.org/officeDocument/2006/relationships" xmlns:p="http://schemas.openxmlformats.org/presentationml/2006/main" type="title" preserve="1">
   <p:cSld name="Title Slide">
@@ -304,7 +295,7 @@
             <a:fld id="{B0544CA6-0BFF-4F49-885A-88A3CCAE5331}" type="datetimeFigureOut">
               <a:rPr lang="en-SG" smtClean="0"/>
               <a:pPr/>
-              <a:t>1/8/2012</a:t>
+              <a:t>20/3/2013</a:t>
             </a:fld>
             <a:endParaRPr lang="en-SG"/>
           </a:p>
@@ -471,7 +462,7 @@
             <a:fld id="{B0544CA6-0BFF-4F49-885A-88A3CCAE5331}" type="datetimeFigureOut">
               <a:rPr lang="en-SG" smtClean="0"/>
               <a:pPr/>
-              <a:t>1/8/2012</a:t>
+              <a:t>20/3/2013</a:t>
             </a:fld>
             <a:endParaRPr lang="en-SG"/>
           </a:p>
@@ -648,7 +639,7 @@
             <a:fld id="{B0544CA6-0BFF-4F49-885A-88A3CCAE5331}" type="datetimeFigureOut">
               <a:rPr lang="en-SG" smtClean="0"/>
               <a:pPr/>
-              <a:t>1/8/2012</a:t>
+              <a:t>20/3/2013</a:t>
             </a:fld>
             <a:endParaRPr lang="en-SG"/>
           </a:p>
@@ -815,7 +806,7 @@
             <a:fld id="{B0544CA6-0BFF-4F49-885A-88A3CCAE5331}" type="datetimeFigureOut">
               <a:rPr lang="en-SG" smtClean="0"/>
               <a:pPr/>
-              <a:t>1/8/2012</a:t>
+              <a:t>20/3/2013</a:t>
             </a:fld>
             <a:endParaRPr lang="en-SG"/>
           </a:p>
@@ -1058,7 +1049,7 @@
             <a:fld id="{B0544CA6-0BFF-4F49-885A-88A3CCAE5331}" type="datetimeFigureOut">
               <a:rPr lang="en-SG" smtClean="0"/>
               <a:pPr/>
-              <a:t>1/8/2012</a:t>
+              <a:t>20/3/2013</a:t>
             </a:fld>
             <a:endParaRPr lang="en-SG"/>
           </a:p>
@@ -1343,7 +1334,7 @@
             <a:fld id="{B0544CA6-0BFF-4F49-885A-88A3CCAE5331}" type="datetimeFigureOut">
               <a:rPr lang="en-SG" smtClean="0"/>
               <a:pPr/>
-              <a:t>1/8/2012</a:t>
+              <a:t>20/3/2013</a:t>
             </a:fld>
             <a:endParaRPr lang="en-SG"/>
           </a:p>
@@ -1762,7 +1753,7 @@
             <a:fld id="{B0544CA6-0BFF-4F49-885A-88A3CCAE5331}" type="datetimeFigureOut">
               <a:rPr lang="en-SG" smtClean="0"/>
               <a:pPr/>
-              <a:t>1/8/2012</a:t>
+              <a:t>20/3/2013</a:t>
             </a:fld>
             <a:endParaRPr lang="en-SG"/>
           </a:p>
@@ -1877,7 +1868,7 @@
             <a:fld id="{B0544CA6-0BFF-4F49-885A-88A3CCAE5331}" type="datetimeFigureOut">
               <a:rPr lang="en-SG" smtClean="0"/>
               <a:pPr/>
-              <a:t>1/8/2012</a:t>
+              <a:t>20/3/2013</a:t>
             </a:fld>
             <a:endParaRPr lang="en-SG"/>
           </a:p>
@@ -1969,7 +1960,7 @@
             <a:fld id="{B0544CA6-0BFF-4F49-885A-88A3CCAE5331}" type="datetimeFigureOut">
               <a:rPr lang="en-SG" smtClean="0"/>
               <a:pPr/>
-              <a:t>1/8/2012</a:t>
+              <a:t>20/3/2013</a:t>
             </a:fld>
             <a:endParaRPr lang="en-SG"/>
           </a:p>
@@ -2243,7 +2234,7 @@
             <a:fld id="{B0544CA6-0BFF-4F49-885A-88A3CCAE5331}" type="datetimeFigureOut">
               <a:rPr lang="en-SG" smtClean="0"/>
               <a:pPr/>
-              <a:t>1/8/2012</a:t>
+              <a:t>20/3/2013</a:t>
             </a:fld>
             <a:endParaRPr lang="en-SG"/>
           </a:p>
@@ -2493,7 +2484,7 @@
             <a:fld id="{B0544CA6-0BFF-4F49-885A-88A3CCAE5331}" type="datetimeFigureOut">
               <a:rPr lang="en-SG" smtClean="0"/>
               <a:pPr/>
-              <a:t>1/8/2012</a:t>
+              <a:t>20/3/2013</a:t>
             </a:fld>
             <a:endParaRPr lang="en-SG"/>
           </a:p>
@@ -2703,7 +2694,7 @@
             <a:fld id="{B0544CA6-0BFF-4F49-885A-88A3CCAE5331}" type="datetimeFigureOut">
               <a:rPr lang="en-SG" smtClean="0"/>
               <a:pPr/>
-              <a:t>1/8/2012</a:t>
+              <a:t>20/3/2013</a:t>
             </a:fld>
             <a:endParaRPr lang="en-SG"/>
           </a:p>
@@ -3313,32 +3304,377 @@
           </a:p>
         </p:txBody>
       </p:sp>
-      <p:pic>
-        <p:nvPicPr>
-          <p:cNvPr id="9" name="Picture 8" descr="C:\Users\dcsdcr\AppData\Local\Microsoft\Windows\Temporary Internet Files\Content.IE5\8EW2YN38\MC900432621[1].png"/>
-          <p:cNvPicPr>
-            <a:picLocks noChangeAspect="1" noChangeArrowheads="1"/>
-          </p:cNvPicPr>
+      <p:grpSp>
+        <p:nvGrpSpPr>
+          <p:cNvPr id="10" name="Group 9"/>
+          <p:cNvGrpSpPr>
+            <a:grpSpLocks noChangeAspect="1"/>
+          </p:cNvGrpSpPr>
           <p:nvPr/>
-        </p:nvPicPr>
-        <p:blipFill>
-          <a:blip r:embed="rId3" cstate="print"/>
-          <a:srcRect/>
-          <a:stretch>
-            <a:fillRect/>
-          </a:stretch>
-        </p:blipFill>
-        <p:spPr bwMode="auto">
-          <a:xfrm flipH="1">
-            <a:off x="297213" y="657055"/>
-            <a:ext cx="711271" cy="711271"/>
+        </p:nvGrpSpPr>
+        <p:grpSpPr>
+          <a:xfrm>
+            <a:off x="432420" y="670818"/>
+            <a:ext cx="364763" cy="635048"/>
+            <a:chOff x="638861" y="309422"/>
+            <a:chExt cx="298983" cy="520531"/>
           </a:xfrm>
-          <a:prstGeom prst="rect">
-            <a:avLst/>
-          </a:prstGeom>
-          <a:noFill/>
-        </p:spPr>
-      </p:pic>
+        </p:grpSpPr>
+        <p:sp>
+          <p:nvSpPr>
+            <p:cNvPr id="11" name="Flowchart: Connector 10"/>
+            <p:cNvSpPr/>
+            <p:nvPr/>
+          </p:nvSpPr>
+          <p:spPr>
+            <a:xfrm>
+              <a:off x="678021" y="309422"/>
+              <a:ext cx="220662" cy="220662"/>
+            </a:xfrm>
+            <a:prstGeom prst="flowChartConnector">
+              <a:avLst/>
+            </a:prstGeom>
+            <a:solidFill>
+              <a:schemeClr val="bg1"/>
+            </a:solidFill>
+          </p:spPr>
+          <p:style>
+            <a:lnRef idx="2">
+              <a:schemeClr val="accent1">
+                <a:shade val="50000"/>
+              </a:schemeClr>
+            </a:lnRef>
+            <a:fillRef idx="1">
+              <a:schemeClr val="accent1"/>
+            </a:fillRef>
+            <a:effectRef idx="0">
+              <a:schemeClr val="accent1"/>
+            </a:effectRef>
+            <a:fontRef idx="minor">
+              <a:schemeClr val="lt1"/>
+            </a:fontRef>
+          </p:style>
+          <p:txBody>
+            <a:bodyPr rtlCol="0" anchor="ctr"/>
+            <a:lstStyle/>
+            <a:p>
+              <a:pPr algn="ctr"/>
+              <a:endParaRPr lang="en-SG"/>
+            </a:p>
+          </p:txBody>
+        </p:sp>
+        <p:grpSp>
+          <p:nvGrpSpPr>
+            <p:cNvPr id="12" name="Group 11"/>
+            <p:cNvGrpSpPr/>
+            <p:nvPr/>
+          </p:nvGrpSpPr>
+          <p:grpSpPr>
+            <a:xfrm>
+              <a:off x="638861" y="549600"/>
+              <a:ext cx="298983" cy="280353"/>
+              <a:chOff x="638861" y="549600"/>
+              <a:chExt cx="298983" cy="280353"/>
+            </a:xfrm>
+          </p:grpSpPr>
+          <p:sp>
+            <p:nvSpPr>
+              <p:cNvPr id="15" name="Flowchart: Delay 14"/>
+              <p:cNvSpPr/>
+              <p:nvPr/>
+            </p:nvSpPr>
+            <p:spPr>
+              <a:xfrm rot="16200000">
+                <a:off x="648176" y="540285"/>
+                <a:ext cx="280353" cy="298983"/>
+              </a:xfrm>
+              <a:prstGeom prst="flowChartDelay">
+                <a:avLst/>
+              </a:prstGeom>
+              <a:solidFill>
+                <a:schemeClr val="bg1"/>
+              </a:solidFill>
+            </p:spPr>
+            <p:style>
+              <a:lnRef idx="2">
+                <a:schemeClr val="accent1">
+                  <a:shade val="50000"/>
+                </a:schemeClr>
+              </a:lnRef>
+              <a:fillRef idx="1">
+                <a:schemeClr val="accent1"/>
+              </a:fillRef>
+              <a:effectRef idx="0">
+                <a:schemeClr val="accent1"/>
+              </a:effectRef>
+              <a:fontRef idx="minor">
+                <a:schemeClr val="lt1"/>
+              </a:fontRef>
+            </p:style>
+            <p:txBody>
+              <a:bodyPr rtlCol="0" anchor="ctr"/>
+              <a:lstStyle/>
+              <a:p>
+                <a:pPr algn="ctr"/>
+                <a:endParaRPr lang="en-SG"/>
+              </a:p>
+            </p:txBody>
+          </p:sp>
+          <p:sp>
+            <p:nvSpPr>
+              <p:cNvPr id="16" name="Freeform 15"/>
+              <p:cNvSpPr/>
+              <p:nvPr/>
+            </p:nvSpPr>
+            <p:spPr>
+              <a:xfrm>
+                <a:off x="737215" y="552954"/>
+                <a:ext cx="102393" cy="235744"/>
+              </a:xfrm>
+              <a:custGeom>
+                <a:avLst/>
+                <a:gdLst>
+                  <a:gd name="connsiteX0" fmla="*/ 47625 w 102393"/>
+                  <a:gd name="connsiteY0" fmla="*/ 0 h 235744"/>
+                  <a:gd name="connsiteX1" fmla="*/ 0 w 102393"/>
+                  <a:gd name="connsiteY1" fmla="*/ 185738 h 235744"/>
+                  <a:gd name="connsiteX2" fmla="*/ 57150 w 102393"/>
+                  <a:gd name="connsiteY2" fmla="*/ 235744 h 235744"/>
+                  <a:gd name="connsiteX3" fmla="*/ 102393 w 102393"/>
+                  <a:gd name="connsiteY3" fmla="*/ 171450 h 235744"/>
+                  <a:gd name="connsiteX4" fmla="*/ 47625 w 102393"/>
+                  <a:gd name="connsiteY4" fmla="*/ 0 h 235744"/>
+                </a:gdLst>
+                <a:ahLst/>
+                <a:cxnLst>
+                  <a:cxn ang="0">
+                    <a:pos x="connsiteX0" y="connsiteY0"/>
+                  </a:cxn>
+                  <a:cxn ang="0">
+                    <a:pos x="connsiteX1" y="connsiteY1"/>
+                  </a:cxn>
+                  <a:cxn ang="0">
+                    <a:pos x="connsiteX2" y="connsiteY2"/>
+                  </a:cxn>
+                  <a:cxn ang="0">
+                    <a:pos x="connsiteX3" y="connsiteY3"/>
+                  </a:cxn>
+                  <a:cxn ang="0">
+                    <a:pos x="connsiteX4" y="connsiteY4"/>
+                  </a:cxn>
+                </a:cxnLst>
+                <a:rect l="l" t="t" r="r" b="b"/>
+                <a:pathLst>
+                  <a:path w="102393" h="235744">
+                    <a:moveTo>
+                      <a:pt x="47625" y="0"/>
+                    </a:moveTo>
+                    <a:lnTo>
+                      <a:pt x="0" y="185738"/>
+                    </a:lnTo>
+                    <a:lnTo>
+                      <a:pt x="57150" y="235744"/>
+                    </a:lnTo>
+                    <a:lnTo>
+                      <a:pt x="102393" y="171450"/>
+                    </a:lnTo>
+                    <a:lnTo>
+                      <a:pt x="47625" y="0"/>
+                    </a:lnTo>
+                    <a:close/>
+                  </a:path>
+                </a:pathLst>
+              </a:custGeom>
+              <a:solidFill>
+                <a:schemeClr val="bg1"/>
+              </a:solidFill>
+            </p:spPr>
+            <p:style>
+              <a:lnRef idx="2">
+                <a:schemeClr val="accent1">
+                  <a:shade val="50000"/>
+                </a:schemeClr>
+              </a:lnRef>
+              <a:fillRef idx="1">
+                <a:schemeClr val="accent1"/>
+              </a:fillRef>
+              <a:effectRef idx="0">
+                <a:schemeClr val="accent1"/>
+              </a:effectRef>
+              <a:fontRef idx="minor">
+                <a:schemeClr val="lt1"/>
+              </a:fontRef>
+            </p:style>
+            <p:txBody>
+              <a:bodyPr rtlCol="0" anchor="ctr"/>
+              <a:lstStyle/>
+              <a:p>
+                <a:pPr algn="ctr"/>
+                <a:endParaRPr lang="en-SG"/>
+              </a:p>
+            </p:txBody>
+          </p:sp>
+        </p:grpSp>
+        <p:sp>
+          <p:nvSpPr>
+            <p:cNvPr id="13" name="Freeform 12"/>
+            <p:cNvSpPr/>
+            <p:nvPr/>
+          </p:nvSpPr>
+          <p:spPr>
+            <a:xfrm>
+              <a:off x="882472" y="469611"/>
+              <a:ext cx="50006" cy="19050"/>
+            </a:xfrm>
+            <a:custGeom>
+              <a:avLst/>
+              <a:gdLst>
+                <a:gd name="connsiteX0" fmla="*/ 0 w 50006"/>
+                <a:gd name="connsiteY0" fmla="*/ 0 h 19050"/>
+                <a:gd name="connsiteX1" fmla="*/ 0 w 50006"/>
+                <a:gd name="connsiteY1" fmla="*/ 0 h 19050"/>
+                <a:gd name="connsiteX2" fmla="*/ 21431 w 50006"/>
+                <a:gd name="connsiteY2" fmla="*/ 4762 h 19050"/>
+                <a:gd name="connsiteX3" fmla="*/ 28575 w 50006"/>
+                <a:gd name="connsiteY3" fmla="*/ 9525 h 19050"/>
+                <a:gd name="connsiteX4" fmla="*/ 38100 w 50006"/>
+                <a:gd name="connsiteY4" fmla="*/ 14287 h 19050"/>
+                <a:gd name="connsiteX5" fmla="*/ 50006 w 50006"/>
+                <a:gd name="connsiteY5" fmla="*/ 19050 h 19050"/>
+              </a:gdLst>
+              <a:ahLst/>
+              <a:cxnLst>
+                <a:cxn ang="0">
+                  <a:pos x="connsiteX0" y="connsiteY0"/>
+                </a:cxn>
+                <a:cxn ang="0">
+                  <a:pos x="connsiteX1" y="connsiteY1"/>
+                </a:cxn>
+                <a:cxn ang="0">
+                  <a:pos x="connsiteX2" y="connsiteY2"/>
+                </a:cxn>
+                <a:cxn ang="0">
+                  <a:pos x="connsiteX3" y="connsiteY3"/>
+                </a:cxn>
+                <a:cxn ang="0">
+                  <a:pos x="connsiteX4" y="connsiteY4"/>
+                </a:cxn>
+                <a:cxn ang="0">
+                  <a:pos x="connsiteX5" y="connsiteY5"/>
+                </a:cxn>
+              </a:cxnLst>
+              <a:rect l="l" t="t" r="r" b="b"/>
+              <a:pathLst>
+                <a:path w="50006" h="19050">
+                  <a:moveTo>
+                    <a:pt x="0" y="0"/>
+                  </a:moveTo>
+                  <a:lnTo>
+                    <a:pt x="0" y="0"/>
+                  </a:lnTo>
+                  <a:cubicBezTo>
+                    <a:pt x="7144" y="1587"/>
+                    <a:pt x="14489" y="2448"/>
+                    <a:pt x="21431" y="4762"/>
+                  </a:cubicBezTo>
+                  <a:cubicBezTo>
+                    <a:pt x="24146" y="5667"/>
+                    <a:pt x="26090" y="8105"/>
+                    <a:pt x="28575" y="9525"/>
+                  </a:cubicBezTo>
+                  <a:cubicBezTo>
+                    <a:pt x="31657" y="11286"/>
+                    <a:pt x="34837" y="12889"/>
+                    <a:pt x="38100" y="14287"/>
+                  </a:cubicBezTo>
+                  <a:cubicBezTo>
+                    <a:pt x="58672" y="23103"/>
+                    <a:pt x="34691" y="11391"/>
+                    <a:pt x="50006" y="19050"/>
+                  </a:cubicBezTo>
+                </a:path>
+              </a:pathLst>
+            </a:custGeom>
+            <a:solidFill>
+              <a:schemeClr val="bg1"/>
+            </a:solidFill>
+          </p:spPr>
+          <p:style>
+            <a:lnRef idx="2">
+              <a:schemeClr val="accent1">
+                <a:shade val="50000"/>
+              </a:schemeClr>
+            </a:lnRef>
+            <a:fillRef idx="1">
+              <a:schemeClr val="accent1"/>
+            </a:fillRef>
+            <a:effectRef idx="0">
+              <a:schemeClr val="accent1"/>
+            </a:effectRef>
+            <a:fontRef idx="minor">
+              <a:schemeClr val="lt1"/>
+            </a:fontRef>
+          </p:style>
+          <p:txBody>
+            <a:bodyPr rtlCol="0" anchor="ctr"/>
+            <a:lstStyle/>
+            <a:p>
+              <a:pPr algn="ctr"/>
+              <a:endParaRPr lang="en-SG"/>
+            </a:p>
+          </p:txBody>
+        </p:sp>
+        <p:sp>
+          <p:nvSpPr>
+            <p:cNvPr id="14" name="Flowchart: Connector 13"/>
+            <p:cNvSpPr/>
+            <p:nvPr/>
+          </p:nvSpPr>
+          <p:spPr>
+            <a:xfrm>
+              <a:off x="800257" y="354516"/>
+              <a:ext cx="45719" cy="45719"/>
+            </a:xfrm>
+            <a:prstGeom prst="flowChartConnector">
+              <a:avLst/>
+            </a:prstGeom>
+            <a:solidFill>
+              <a:schemeClr val="bg1"/>
+            </a:solidFill>
+            <a:ln>
+              <a:solidFill>
+                <a:schemeClr val="accent1">
+                  <a:lumMod val="75000"/>
+                </a:schemeClr>
+              </a:solidFill>
+            </a:ln>
+          </p:spPr>
+          <p:style>
+            <a:lnRef idx="2">
+              <a:schemeClr val="accent1">
+                <a:shade val="50000"/>
+              </a:schemeClr>
+            </a:lnRef>
+            <a:fillRef idx="1">
+              <a:schemeClr val="accent1"/>
+            </a:fillRef>
+            <a:effectRef idx="0">
+              <a:schemeClr val="accent1"/>
+            </a:effectRef>
+            <a:fontRef idx="minor">
+              <a:schemeClr val="lt1"/>
+            </a:fontRef>
+          </p:style>
+          <p:txBody>
+            <a:bodyPr rtlCol="0" anchor="ctr"/>
+            <a:lstStyle/>
+            <a:p>
+              <a:pPr algn="ctr"/>
+              <a:endParaRPr lang="en-SG"/>
+            </a:p>
+          </p:txBody>
+        </p:sp>
+      </p:grpSp>
     </p:spTree>
   </p:cSld>
   <p:clrMapOvr>

</xml_diff>

<commit_message>
Synching Issue514 [Increase Course ID and Course Name character limit]
</commit_message>
<xml_diff>
--- a/doc/mockups/features-screenshots/feature1-addCourse.pptx
+++ b/doc/mockups/features-screenshots/feature1-addCourse.pptx
@@ -113,15 +113,6 @@
 </p:cmAuthorLst>
 </file>
 
-<file path=ppt/comments/comment1.xml><?xml version="1.0" encoding="utf-8"?>
-<p:cmLst xmlns:a="http://schemas.openxmlformats.org/drawingml/2006/main" xmlns:r="http://schemas.openxmlformats.org/officeDocument/2006/relationships" xmlns:p="http://schemas.openxmlformats.org/presentationml/2006/main">
-  <p:cm authorId="0" dt="2012-08-01T10:32:11.577" idx="1">
-    <p:pos x="1352" y="996"/>
-    <p:text>Button not visible. Not aligned with anything.</p:text>
-  </p:cm>
-</p:cmLst>
-</file>
-
 <file path=ppt/slideLayouts/slideLayout1.xml><?xml version="1.0" encoding="utf-8"?>
 <p:sldLayout xmlns:a="http://schemas.openxmlformats.org/drawingml/2006/main" xmlns:r="http://schemas.openxmlformats.org/officeDocument/2006/relationships" xmlns:p="http://schemas.openxmlformats.org/presentationml/2006/main" type="title" preserve="1">
   <p:cSld name="Title Slide">
@@ -304,7 +295,7 @@
             <a:fld id="{B0544CA6-0BFF-4F49-885A-88A3CCAE5331}" type="datetimeFigureOut">
               <a:rPr lang="en-SG" smtClean="0"/>
               <a:pPr/>
-              <a:t>1/8/2012</a:t>
+              <a:t>20/3/2013</a:t>
             </a:fld>
             <a:endParaRPr lang="en-SG"/>
           </a:p>
@@ -471,7 +462,7 @@
             <a:fld id="{B0544CA6-0BFF-4F49-885A-88A3CCAE5331}" type="datetimeFigureOut">
               <a:rPr lang="en-SG" smtClean="0"/>
               <a:pPr/>
-              <a:t>1/8/2012</a:t>
+              <a:t>20/3/2013</a:t>
             </a:fld>
             <a:endParaRPr lang="en-SG"/>
           </a:p>
@@ -648,7 +639,7 @@
             <a:fld id="{B0544CA6-0BFF-4F49-885A-88A3CCAE5331}" type="datetimeFigureOut">
               <a:rPr lang="en-SG" smtClean="0"/>
               <a:pPr/>
-              <a:t>1/8/2012</a:t>
+              <a:t>20/3/2013</a:t>
             </a:fld>
             <a:endParaRPr lang="en-SG"/>
           </a:p>
@@ -815,7 +806,7 @@
             <a:fld id="{B0544CA6-0BFF-4F49-885A-88A3CCAE5331}" type="datetimeFigureOut">
               <a:rPr lang="en-SG" smtClean="0"/>
               <a:pPr/>
-              <a:t>1/8/2012</a:t>
+              <a:t>20/3/2013</a:t>
             </a:fld>
             <a:endParaRPr lang="en-SG"/>
           </a:p>
@@ -1058,7 +1049,7 @@
             <a:fld id="{B0544CA6-0BFF-4F49-885A-88A3CCAE5331}" type="datetimeFigureOut">
               <a:rPr lang="en-SG" smtClean="0"/>
               <a:pPr/>
-              <a:t>1/8/2012</a:t>
+              <a:t>20/3/2013</a:t>
             </a:fld>
             <a:endParaRPr lang="en-SG"/>
           </a:p>
@@ -1343,7 +1334,7 @@
             <a:fld id="{B0544CA6-0BFF-4F49-885A-88A3CCAE5331}" type="datetimeFigureOut">
               <a:rPr lang="en-SG" smtClean="0"/>
               <a:pPr/>
-              <a:t>1/8/2012</a:t>
+              <a:t>20/3/2013</a:t>
             </a:fld>
             <a:endParaRPr lang="en-SG"/>
           </a:p>
@@ -1762,7 +1753,7 @@
             <a:fld id="{B0544CA6-0BFF-4F49-885A-88A3CCAE5331}" type="datetimeFigureOut">
               <a:rPr lang="en-SG" smtClean="0"/>
               <a:pPr/>
-              <a:t>1/8/2012</a:t>
+              <a:t>20/3/2013</a:t>
             </a:fld>
             <a:endParaRPr lang="en-SG"/>
           </a:p>
@@ -1877,7 +1868,7 @@
             <a:fld id="{B0544CA6-0BFF-4F49-885A-88A3CCAE5331}" type="datetimeFigureOut">
               <a:rPr lang="en-SG" smtClean="0"/>
               <a:pPr/>
-              <a:t>1/8/2012</a:t>
+              <a:t>20/3/2013</a:t>
             </a:fld>
             <a:endParaRPr lang="en-SG"/>
           </a:p>
@@ -1969,7 +1960,7 @@
             <a:fld id="{B0544CA6-0BFF-4F49-885A-88A3CCAE5331}" type="datetimeFigureOut">
               <a:rPr lang="en-SG" smtClean="0"/>
               <a:pPr/>
-              <a:t>1/8/2012</a:t>
+              <a:t>20/3/2013</a:t>
             </a:fld>
             <a:endParaRPr lang="en-SG"/>
           </a:p>
@@ -2243,7 +2234,7 @@
             <a:fld id="{B0544CA6-0BFF-4F49-885A-88A3CCAE5331}" type="datetimeFigureOut">
               <a:rPr lang="en-SG" smtClean="0"/>
               <a:pPr/>
-              <a:t>1/8/2012</a:t>
+              <a:t>20/3/2013</a:t>
             </a:fld>
             <a:endParaRPr lang="en-SG"/>
           </a:p>
@@ -2493,7 +2484,7 @@
             <a:fld id="{B0544CA6-0BFF-4F49-885A-88A3CCAE5331}" type="datetimeFigureOut">
               <a:rPr lang="en-SG" smtClean="0"/>
               <a:pPr/>
-              <a:t>1/8/2012</a:t>
+              <a:t>20/3/2013</a:t>
             </a:fld>
             <a:endParaRPr lang="en-SG"/>
           </a:p>
@@ -2703,7 +2694,7 @@
             <a:fld id="{B0544CA6-0BFF-4F49-885A-88A3CCAE5331}" type="datetimeFigureOut">
               <a:rPr lang="en-SG" smtClean="0"/>
               <a:pPr/>
-              <a:t>1/8/2012</a:t>
+              <a:t>20/3/2013</a:t>
             </a:fld>
             <a:endParaRPr lang="en-SG"/>
           </a:p>
@@ -3313,32 +3304,377 @@
           </a:p>
         </p:txBody>
       </p:sp>
-      <p:pic>
-        <p:nvPicPr>
-          <p:cNvPr id="9" name="Picture 8" descr="C:\Users\dcsdcr\AppData\Local\Microsoft\Windows\Temporary Internet Files\Content.IE5\8EW2YN38\MC900432621[1].png"/>
-          <p:cNvPicPr>
-            <a:picLocks noChangeAspect="1" noChangeArrowheads="1"/>
-          </p:cNvPicPr>
+      <p:grpSp>
+        <p:nvGrpSpPr>
+          <p:cNvPr id="10" name="Group 9"/>
+          <p:cNvGrpSpPr>
+            <a:grpSpLocks noChangeAspect="1"/>
+          </p:cNvGrpSpPr>
           <p:nvPr/>
-        </p:nvPicPr>
-        <p:blipFill>
-          <a:blip r:embed="rId3" cstate="print"/>
-          <a:srcRect/>
-          <a:stretch>
-            <a:fillRect/>
-          </a:stretch>
-        </p:blipFill>
-        <p:spPr bwMode="auto">
-          <a:xfrm flipH="1">
-            <a:off x="297213" y="657055"/>
-            <a:ext cx="711271" cy="711271"/>
+        </p:nvGrpSpPr>
+        <p:grpSpPr>
+          <a:xfrm>
+            <a:off x="432420" y="670818"/>
+            <a:ext cx="364763" cy="635048"/>
+            <a:chOff x="638861" y="309422"/>
+            <a:chExt cx="298983" cy="520531"/>
           </a:xfrm>
-          <a:prstGeom prst="rect">
-            <a:avLst/>
-          </a:prstGeom>
-          <a:noFill/>
-        </p:spPr>
-      </p:pic>
+        </p:grpSpPr>
+        <p:sp>
+          <p:nvSpPr>
+            <p:cNvPr id="11" name="Flowchart: Connector 10"/>
+            <p:cNvSpPr/>
+            <p:nvPr/>
+          </p:nvSpPr>
+          <p:spPr>
+            <a:xfrm>
+              <a:off x="678021" y="309422"/>
+              <a:ext cx="220662" cy="220662"/>
+            </a:xfrm>
+            <a:prstGeom prst="flowChartConnector">
+              <a:avLst/>
+            </a:prstGeom>
+            <a:solidFill>
+              <a:schemeClr val="bg1"/>
+            </a:solidFill>
+          </p:spPr>
+          <p:style>
+            <a:lnRef idx="2">
+              <a:schemeClr val="accent1">
+                <a:shade val="50000"/>
+              </a:schemeClr>
+            </a:lnRef>
+            <a:fillRef idx="1">
+              <a:schemeClr val="accent1"/>
+            </a:fillRef>
+            <a:effectRef idx="0">
+              <a:schemeClr val="accent1"/>
+            </a:effectRef>
+            <a:fontRef idx="minor">
+              <a:schemeClr val="lt1"/>
+            </a:fontRef>
+          </p:style>
+          <p:txBody>
+            <a:bodyPr rtlCol="0" anchor="ctr"/>
+            <a:lstStyle/>
+            <a:p>
+              <a:pPr algn="ctr"/>
+              <a:endParaRPr lang="en-SG"/>
+            </a:p>
+          </p:txBody>
+        </p:sp>
+        <p:grpSp>
+          <p:nvGrpSpPr>
+            <p:cNvPr id="12" name="Group 11"/>
+            <p:cNvGrpSpPr/>
+            <p:nvPr/>
+          </p:nvGrpSpPr>
+          <p:grpSpPr>
+            <a:xfrm>
+              <a:off x="638861" y="549600"/>
+              <a:ext cx="298983" cy="280353"/>
+              <a:chOff x="638861" y="549600"/>
+              <a:chExt cx="298983" cy="280353"/>
+            </a:xfrm>
+          </p:grpSpPr>
+          <p:sp>
+            <p:nvSpPr>
+              <p:cNvPr id="15" name="Flowchart: Delay 14"/>
+              <p:cNvSpPr/>
+              <p:nvPr/>
+            </p:nvSpPr>
+            <p:spPr>
+              <a:xfrm rot="16200000">
+                <a:off x="648176" y="540285"/>
+                <a:ext cx="280353" cy="298983"/>
+              </a:xfrm>
+              <a:prstGeom prst="flowChartDelay">
+                <a:avLst/>
+              </a:prstGeom>
+              <a:solidFill>
+                <a:schemeClr val="bg1"/>
+              </a:solidFill>
+            </p:spPr>
+            <p:style>
+              <a:lnRef idx="2">
+                <a:schemeClr val="accent1">
+                  <a:shade val="50000"/>
+                </a:schemeClr>
+              </a:lnRef>
+              <a:fillRef idx="1">
+                <a:schemeClr val="accent1"/>
+              </a:fillRef>
+              <a:effectRef idx="0">
+                <a:schemeClr val="accent1"/>
+              </a:effectRef>
+              <a:fontRef idx="minor">
+                <a:schemeClr val="lt1"/>
+              </a:fontRef>
+            </p:style>
+            <p:txBody>
+              <a:bodyPr rtlCol="0" anchor="ctr"/>
+              <a:lstStyle/>
+              <a:p>
+                <a:pPr algn="ctr"/>
+                <a:endParaRPr lang="en-SG"/>
+              </a:p>
+            </p:txBody>
+          </p:sp>
+          <p:sp>
+            <p:nvSpPr>
+              <p:cNvPr id="16" name="Freeform 15"/>
+              <p:cNvSpPr/>
+              <p:nvPr/>
+            </p:nvSpPr>
+            <p:spPr>
+              <a:xfrm>
+                <a:off x="737215" y="552954"/>
+                <a:ext cx="102393" cy="235744"/>
+              </a:xfrm>
+              <a:custGeom>
+                <a:avLst/>
+                <a:gdLst>
+                  <a:gd name="connsiteX0" fmla="*/ 47625 w 102393"/>
+                  <a:gd name="connsiteY0" fmla="*/ 0 h 235744"/>
+                  <a:gd name="connsiteX1" fmla="*/ 0 w 102393"/>
+                  <a:gd name="connsiteY1" fmla="*/ 185738 h 235744"/>
+                  <a:gd name="connsiteX2" fmla="*/ 57150 w 102393"/>
+                  <a:gd name="connsiteY2" fmla="*/ 235744 h 235744"/>
+                  <a:gd name="connsiteX3" fmla="*/ 102393 w 102393"/>
+                  <a:gd name="connsiteY3" fmla="*/ 171450 h 235744"/>
+                  <a:gd name="connsiteX4" fmla="*/ 47625 w 102393"/>
+                  <a:gd name="connsiteY4" fmla="*/ 0 h 235744"/>
+                </a:gdLst>
+                <a:ahLst/>
+                <a:cxnLst>
+                  <a:cxn ang="0">
+                    <a:pos x="connsiteX0" y="connsiteY0"/>
+                  </a:cxn>
+                  <a:cxn ang="0">
+                    <a:pos x="connsiteX1" y="connsiteY1"/>
+                  </a:cxn>
+                  <a:cxn ang="0">
+                    <a:pos x="connsiteX2" y="connsiteY2"/>
+                  </a:cxn>
+                  <a:cxn ang="0">
+                    <a:pos x="connsiteX3" y="connsiteY3"/>
+                  </a:cxn>
+                  <a:cxn ang="0">
+                    <a:pos x="connsiteX4" y="connsiteY4"/>
+                  </a:cxn>
+                </a:cxnLst>
+                <a:rect l="l" t="t" r="r" b="b"/>
+                <a:pathLst>
+                  <a:path w="102393" h="235744">
+                    <a:moveTo>
+                      <a:pt x="47625" y="0"/>
+                    </a:moveTo>
+                    <a:lnTo>
+                      <a:pt x="0" y="185738"/>
+                    </a:lnTo>
+                    <a:lnTo>
+                      <a:pt x="57150" y="235744"/>
+                    </a:lnTo>
+                    <a:lnTo>
+                      <a:pt x="102393" y="171450"/>
+                    </a:lnTo>
+                    <a:lnTo>
+                      <a:pt x="47625" y="0"/>
+                    </a:lnTo>
+                    <a:close/>
+                  </a:path>
+                </a:pathLst>
+              </a:custGeom>
+              <a:solidFill>
+                <a:schemeClr val="bg1"/>
+              </a:solidFill>
+            </p:spPr>
+            <p:style>
+              <a:lnRef idx="2">
+                <a:schemeClr val="accent1">
+                  <a:shade val="50000"/>
+                </a:schemeClr>
+              </a:lnRef>
+              <a:fillRef idx="1">
+                <a:schemeClr val="accent1"/>
+              </a:fillRef>
+              <a:effectRef idx="0">
+                <a:schemeClr val="accent1"/>
+              </a:effectRef>
+              <a:fontRef idx="minor">
+                <a:schemeClr val="lt1"/>
+              </a:fontRef>
+            </p:style>
+            <p:txBody>
+              <a:bodyPr rtlCol="0" anchor="ctr"/>
+              <a:lstStyle/>
+              <a:p>
+                <a:pPr algn="ctr"/>
+                <a:endParaRPr lang="en-SG"/>
+              </a:p>
+            </p:txBody>
+          </p:sp>
+        </p:grpSp>
+        <p:sp>
+          <p:nvSpPr>
+            <p:cNvPr id="13" name="Freeform 12"/>
+            <p:cNvSpPr/>
+            <p:nvPr/>
+          </p:nvSpPr>
+          <p:spPr>
+            <a:xfrm>
+              <a:off x="882472" y="469611"/>
+              <a:ext cx="50006" cy="19050"/>
+            </a:xfrm>
+            <a:custGeom>
+              <a:avLst/>
+              <a:gdLst>
+                <a:gd name="connsiteX0" fmla="*/ 0 w 50006"/>
+                <a:gd name="connsiteY0" fmla="*/ 0 h 19050"/>
+                <a:gd name="connsiteX1" fmla="*/ 0 w 50006"/>
+                <a:gd name="connsiteY1" fmla="*/ 0 h 19050"/>
+                <a:gd name="connsiteX2" fmla="*/ 21431 w 50006"/>
+                <a:gd name="connsiteY2" fmla="*/ 4762 h 19050"/>
+                <a:gd name="connsiteX3" fmla="*/ 28575 w 50006"/>
+                <a:gd name="connsiteY3" fmla="*/ 9525 h 19050"/>
+                <a:gd name="connsiteX4" fmla="*/ 38100 w 50006"/>
+                <a:gd name="connsiteY4" fmla="*/ 14287 h 19050"/>
+                <a:gd name="connsiteX5" fmla="*/ 50006 w 50006"/>
+                <a:gd name="connsiteY5" fmla="*/ 19050 h 19050"/>
+              </a:gdLst>
+              <a:ahLst/>
+              <a:cxnLst>
+                <a:cxn ang="0">
+                  <a:pos x="connsiteX0" y="connsiteY0"/>
+                </a:cxn>
+                <a:cxn ang="0">
+                  <a:pos x="connsiteX1" y="connsiteY1"/>
+                </a:cxn>
+                <a:cxn ang="0">
+                  <a:pos x="connsiteX2" y="connsiteY2"/>
+                </a:cxn>
+                <a:cxn ang="0">
+                  <a:pos x="connsiteX3" y="connsiteY3"/>
+                </a:cxn>
+                <a:cxn ang="0">
+                  <a:pos x="connsiteX4" y="connsiteY4"/>
+                </a:cxn>
+                <a:cxn ang="0">
+                  <a:pos x="connsiteX5" y="connsiteY5"/>
+                </a:cxn>
+              </a:cxnLst>
+              <a:rect l="l" t="t" r="r" b="b"/>
+              <a:pathLst>
+                <a:path w="50006" h="19050">
+                  <a:moveTo>
+                    <a:pt x="0" y="0"/>
+                  </a:moveTo>
+                  <a:lnTo>
+                    <a:pt x="0" y="0"/>
+                  </a:lnTo>
+                  <a:cubicBezTo>
+                    <a:pt x="7144" y="1587"/>
+                    <a:pt x="14489" y="2448"/>
+                    <a:pt x="21431" y="4762"/>
+                  </a:cubicBezTo>
+                  <a:cubicBezTo>
+                    <a:pt x="24146" y="5667"/>
+                    <a:pt x="26090" y="8105"/>
+                    <a:pt x="28575" y="9525"/>
+                  </a:cubicBezTo>
+                  <a:cubicBezTo>
+                    <a:pt x="31657" y="11286"/>
+                    <a:pt x="34837" y="12889"/>
+                    <a:pt x="38100" y="14287"/>
+                  </a:cubicBezTo>
+                  <a:cubicBezTo>
+                    <a:pt x="58672" y="23103"/>
+                    <a:pt x="34691" y="11391"/>
+                    <a:pt x="50006" y="19050"/>
+                  </a:cubicBezTo>
+                </a:path>
+              </a:pathLst>
+            </a:custGeom>
+            <a:solidFill>
+              <a:schemeClr val="bg1"/>
+            </a:solidFill>
+          </p:spPr>
+          <p:style>
+            <a:lnRef idx="2">
+              <a:schemeClr val="accent1">
+                <a:shade val="50000"/>
+              </a:schemeClr>
+            </a:lnRef>
+            <a:fillRef idx="1">
+              <a:schemeClr val="accent1"/>
+            </a:fillRef>
+            <a:effectRef idx="0">
+              <a:schemeClr val="accent1"/>
+            </a:effectRef>
+            <a:fontRef idx="minor">
+              <a:schemeClr val="lt1"/>
+            </a:fontRef>
+          </p:style>
+          <p:txBody>
+            <a:bodyPr rtlCol="0" anchor="ctr"/>
+            <a:lstStyle/>
+            <a:p>
+              <a:pPr algn="ctr"/>
+              <a:endParaRPr lang="en-SG"/>
+            </a:p>
+          </p:txBody>
+        </p:sp>
+        <p:sp>
+          <p:nvSpPr>
+            <p:cNvPr id="14" name="Flowchart: Connector 13"/>
+            <p:cNvSpPr/>
+            <p:nvPr/>
+          </p:nvSpPr>
+          <p:spPr>
+            <a:xfrm>
+              <a:off x="800257" y="354516"/>
+              <a:ext cx="45719" cy="45719"/>
+            </a:xfrm>
+            <a:prstGeom prst="flowChartConnector">
+              <a:avLst/>
+            </a:prstGeom>
+            <a:solidFill>
+              <a:schemeClr val="bg1"/>
+            </a:solidFill>
+            <a:ln>
+              <a:solidFill>
+                <a:schemeClr val="accent1">
+                  <a:lumMod val="75000"/>
+                </a:schemeClr>
+              </a:solidFill>
+            </a:ln>
+          </p:spPr>
+          <p:style>
+            <a:lnRef idx="2">
+              <a:schemeClr val="accent1">
+                <a:shade val="50000"/>
+              </a:schemeClr>
+            </a:lnRef>
+            <a:fillRef idx="1">
+              <a:schemeClr val="accent1"/>
+            </a:fillRef>
+            <a:effectRef idx="0">
+              <a:schemeClr val="accent1"/>
+            </a:effectRef>
+            <a:fontRef idx="minor">
+              <a:schemeClr val="lt1"/>
+            </a:fontRef>
+          </p:style>
+          <p:txBody>
+            <a:bodyPr rtlCol="0" anchor="ctr"/>
+            <a:lstStyle/>
+            <a:p>
+              <a:pPr algn="ctr"/>
+              <a:endParaRPr lang="en-SG"/>
+            </a:p>
+          </p:txBody>
+        </p:sp>
+      </p:grpSp>
     </p:spTree>
   </p:cSld>
   <p:clrMapOvr>

</xml_diff>

<commit_message>
Syncing Issue721 [Extract new package: teammates.client]
</commit_message>
<xml_diff>
--- a/doc/mockups/features-screenshots/feature1-addCourse.pptx
+++ b/doc/mockups/features-screenshots/feature1-addCourse.pptx
@@ -113,15 +113,6 @@
 </p:cmAuthorLst>
 </file>
 
-<file path=ppt/comments/comment1.xml><?xml version="1.0" encoding="utf-8"?>
-<p:cmLst xmlns:a="http://schemas.openxmlformats.org/drawingml/2006/main" xmlns:r="http://schemas.openxmlformats.org/officeDocument/2006/relationships" xmlns:p="http://schemas.openxmlformats.org/presentationml/2006/main">
-  <p:cm authorId="0" dt="2012-08-01T10:32:11.577" idx="1">
-    <p:pos x="1352" y="996"/>
-    <p:text>Button not visible. Not aligned with anything.</p:text>
-  </p:cm>
-</p:cmLst>
-</file>
-
 <file path=ppt/slideLayouts/slideLayout1.xml><?xml version="1.0" encoding="utf-8"?>
 <p:sldLayout xmlns:a="http://schemas.openxmlformats.org/drawingml/2006/main" xmlns:r="http://schemas.openxmlformats.org/officeDocument/2006/relationships" xmlns:p="http://schemas.openxmlformats.org/presentationml/2006/main" type="title" preserve="1">
   <p:cSld name="Title Slide">
@@ -304,7 +295,7 @@
             <a:fld id="{B0544CA6-0BFF-4F49-885A-88A3CCAE5331}" type="datetimeFigureOut">
               <a:rPr lang="en-SG" smtClean="0"/>
               <a:pPr/>
-              <a:t>1/8/2012</a:t>
+              <a:t>20/3/2013</a:t>
             </a:fld>
             <a:endParaRPr lang="en-SG"/>
           </a:p>
@@ -471,7 +462,7 @@
             <a:fld id="{B0544CA6-0BFF-4F49-885A-88A3CCAE5331}" type="datetimeFigureOut">
               <a:rPr lang="en-SG" smtClean="0"/>
               <a:pPr/>
-              <a:t>1/8/2012</a:t>
+              <a:t>20/3/2013</a:t>
             </a:fld>
             <a:endParaRPr lang="en-SG"/>
           </a:p>
@@ -648,7 +639,7 @@
             <a:fld id="{B0544CA6-0BFF-4F49-885A-88A3CCAE5331}" type="datetimeFigureOut">
               <a:rPr lang="en-SG" smtClean="0"/>
               <a:pPr/>
-              <a:t>1/8/2012</a:t>
+              <a:t>20/3/2013</a:t>
             </a:fld>
             <a:endParaRPr lang="en-SG"/>
           </a:p>
@@ -815,7 +806,7 @@
             <a:fld id="{B0544CA6-0BFF-4F49-885A-88A3CCAE5331}" type="datetimeFigureOut">
               <a:rPr lang="en-SG" smtClean="0"/>
               <a:pPr/>
-              <a:t>1/8/2012</a:t>
+              <a:t>20/3/2013</a:t>
             </a:fld>
             <a:endParaRPr lang="en-SG"/>
           </a:p>
@@ -1058,7 +1049,7 @@
             <a:fld id="{B0544CA6-0BFF-4F49-885A-88A3CCAE5331}" type="datetimeFigureOut">
               <a:rPr lang="en-SG" smtClean="0"/>
               <a:pPr/>
-              <a:t>1/8/2012</a:t>
+              <a:t>20/3/2013</a:t>
             </a:fld>
             <a:endParaRPr lang="en-SG"/>
           </a:p>
@@ -1343,7 +1334,7 @@
             <a:fld id="{B0544CA6-0BFF-4F49-885A-88A3CCAE5331}" type="datetimeFigureOut">
               <a:rPr lang="en-SG" smtClean="0"/>
               <a:pPr/>
-              <a:t>1/8/2012</a:t>
+              <a:t>20/3/2013</a:t>
             </a:fld>
             <a:endParaRPr lang="en-SG"/>
           </a:p>
@@ -1762,7 +1753,7 @@
             <a:fld id="{B0544CA6-0BFF-4F49-885A-88A3CCAE5331}" type="datetimeFigureOut">
               <a:rPr lang="en-SG" smtClean="0"/>
               <a:pPr/>
-              <a:t>1/8/2012</a:t>
+              <a:t>20/3/2013</a:t>
             </a:fld>
             <a:endParaRPr lang="en-SG"/>
           </a:p>
@@ -1877,7 +1868,7 @@
             <a:fld id="{B0544CA6-0BFF-4F49-885A-88A3CCAE5331}" type="datetimeFigureOut">
               <a:rPr lang="en-SG" smtClean="0"/>
               <a:pPr/>
-              <a:t>1/8/2012</a:t>
+              <a:t>20/3/2013</a:t>
             </a:fld>
             <a:endParaRPr lang="en-SG"/>
           </a:p>
@@ -1969,7 +1960,7 @@
             <a:fld id="{B0544CA6-0BFF-4F49-885A-88A3CCAE5331}" type="datetimeFigureOut">
               <a:rPr lang="en-SG" smtClean="0"/>
               <a:pPr/>
-              <a:t>1/8/2012</a:t>
+              <a:t>20/3/2013</a:t>
             </a:fld>
             <a:endParaRPr lang="en-SG"/>
           </a:p>
@@ -2243,7 +2234,7 @@
             <a:fld id="{B0544CA6-0BFF-4F49-885A-88A3CCAE5331}" type="datetimeFigureOut">
               <a:rPr lang="en-SG" smtClean="0"/>
               <a:pPr/>
-              <a:t>1/8/2012</a:t>
+              <a:t>20/3/2013</a:t>
             </a:fld>
             <a:endParaRPr lang="en-SG"/>
           </a:p>
@@ -2493,7 +2484,7 @@
             <a:fld id="{B0544CA6-0BFF-4F49-885A-88A3CCAE5331}" type="datetimeFigureOut">
               <a:rPr lang="en-SG" smtClean="0"/>
               <a:pPr/>
-              <a:t>1/8/2012</a:t>
+              <a:t>20/3/2013</a:t>
             </a:fld>
             <a:endParaRPr lang="en-SG"/>
           </a:p>
@@ -2703,7 +2694,7 @@
             <a:fld id="{B0544CA6-0BFF-4F49-885A-88A3CCAE5331}" type="datetimeFigureOut">
               <a:rPr lang="en-SG" smtClean="0"/>
               <a:pPr/>
-              <a:t>1/8/2012</a:t>
+              <a:t>20/3/2013</a:t>
             </a:fld>
             <a:endParaRPr lang="en-SG"/>
           </a:p>
@@ -3313,32 +3304,377 @@
           </a:p>
         </p:txBody>
       </p:sp>
-      <p:pic>
-        <p:nvPicPr>
-          <p:cNvPr id="9" name="Picture 8" descr="C:\Users\dcsdcr\AppData\Local\Microsoft\Windows\Temporary Internet Files\Content.IE5\8EW2YN38\MC900432621[1].png"/>
-          <p:cNvPicPr>
-            <a:picLocks noChangeAspect="1" noChangeArrowheads="1"/>
-          </p:cNvPicPr>
+      <p:grpSp>
+        <p:nvGrpSpPr>
+          <p:cNvPr id="10" name="Group 9"/>
+          <p:cNvGrpSpPr>
+            <a:grpSpLocks noChangeAspect="1"/>
+          </p:cNvGrpSpPr>
           <p:nvPr/>
-        </p:nvPicPr>
-        <p:blipFill>
-          <a:blip r:embed="rId3" cstate="print"/>
-          <a:srcRect/>
-          <a:stretch>
-            <a:fillRect/>
-          </a:stretch>
-        </p:blipFill>
-        <p:spPr bwMode="auto">
-          <a:xfrm flipH="1">
-            <a:off x="297213" y="657055"/>
-            <a:ext cx="711271" cy="711271"/>
+        </p:nvGrpSpPr>
+        <p:grpSpPr>
+          <a:xfrm>
+            <a:off x="432420" y="670818"/>
+            <a:ext cx="364763" cy="635048"/>
+            <a:chOff x="638861" y="309422"/>
+            <a:chExt cx="298983" cy="520531"/>
           </a:xfrm>
-          <a:prstGeom prst="rect">
-            <a:avLst/>
-          </a:prstGeom>
-          <a:noFill/>
-        </p:spPr>
-      </p:pic>
+        </p:grpSpPr>
+        <p:sp>
+          <p:nvSpPr>
+            <p:cNvPr id="11" name="Flowchart: Connector 10"/>
+            <p:cNvSpPr/>
+            <p:nvPr/>
+          </p:nvSpPr>
+          <p:spPr>
+            <a:xfrm>
+              <a:off x="678021" y="309422"/>
+              <a:ext cx="220662" cy="220662"/>
+            </a:xfrm>
+            <a:prstGeom prst="flowChartConnector">
+              <a:avLst/>
+            </a:prstGeom>
+            <a:solidFill>
+              <a:schemeClr val="bg1"/>
+            </a:solidFill>
+          </p:spPr>
+          <p:style>
+            <a:lnRef idx="2">
+              <a:schemeClr val="accent1">
+                <a:shade val="50000"/>
+              </a:schemeClr>
+            </a:lnRef>
+            <a:fillRef idx="1">
+              <a:schemeClr val="accent1"/>
+            </a:fillRef>
+            <a:effectRef idx="0">
+              <a:schemeClr val="accent1"/>
+            </a:effectRef>
+            <a:fontRef idx="minor">
+              <a:schemeClr val="lt1"/>
+            </a:fontRef>
+          </p:style>
+          <p:txBody>
+            <a:bodyPr rtlCol="0" anchor="ctr"/>
+            <a:lstStyle/>
+            <a:p>
+              <a:pPr algn="ctr"/>
+              <a:endParaRPr lang="en-SG"/>
+            </a:p>
+          </p:txBody>
+        </p:sp>
+        <p:grpSp>
+          <p:nvGrpSpPr>
+            <p:cNvPr id="12" name="Group 11"/>
+            <p:cNvGrpSpPr/>
+            <p:nvPr/>
+          </p:nvGrpSpPr>
+          <p:grpSpPr>
+            <a:xfrm>
+              <a:off x="638861" y="549600"/>
+              <a:ext cx="298983" cy="280353"/>
+              <a:chOff x="638861" y="549600"/>
+              <a:chExt cx="298983" cy="280353"/>
+            </a:xfrm>
+          </p:grpSpPr>
+          <p:sp>
+            <p:nvSpPr>
+              <p:cNvPr id="15" name="Flowchart: Delay 14"/>
+              <p:cNvSpPr/>
+              <p:nvPr/>
+            </p:nvSpPr>
+            <p:spPr>
+              <a:xfrm rot="16200000">
+                <a:off x="648176" y="540285"/>
+                <a:ext cx="280353" cy="298983"/>
+              </a:xfrm>
+              <a:prstGeom prst="flowChartDelay">
+                <a:avLst/>
+              </a:prstGeom>
+              <a:solidFill>
+                <a:schemeClr val="bg1"/>
+              </a:solidFill>
+            </p:spPr>
+            <p:style>
+              <a:lnRef idx="2">
+                <a:schemeClr val="accent1">
+                  <a:shade val="50000"/>
+                </a:schemeClr>
+              </a:lnRef>
+              <a:fillRef idx="1">
+                <a:schemeClr val="accent1"/>
+              </a:fillRef>
+              <a:effectRef idx="0">
+                <a:schemeClr val="accent1"/>
+              </a:effectRef>
+              <a:fontRef idx="minor">
+                <a:schemeClr val="lt1"/>
+              </a:fontRef>
+            </p:style>
+            <p:txBody>
+              <a:bodyPr rtlCol="0" anchor="ctr"/>
+              <a:lstStyle/>
+              <a:p>
+                <a:pPr algn="ctr"/>
+                <a:endParaRPr lang="en-SG"/>
+              </a:p>
+            </p:txBody>
+          </p:sp>
+          <p:sp>
+            <p:nvSpPr>
+              <p:cNvPr id="16" name="Freeform 15"/>
+              <p:cNvSpPr/>
+              <p:nvPr/>
+            </p:nvSpPr>
+            <p:spPr>
+              <a:xfrm>
+                <a:off x="737215" y="552954"/>
+                <a:ext cx="102393" cy="235744"/>
+              </a:xfrm>
+              <a:custGeom>
+                <a:avLst/>
+                <a:gdLst>
+                  <a:gd name="connsiteX0" fmla="*/ 47625 w 102393"/>
+                  <a:gd name="connsiteY0" fmla="*/ 0 h 235744"/>
+                  <a:gd name="connsiteX1" fmla="*/ 0 w 102393"/>
+                  <a:gd name="connsiteY1" fmla="*/ 185738 h 235744"/>
+                  <a:gd name="connsiteX2" fmla="*/ 57150 w 102393"/>
+                  <a:gd name="connsiteY2" fmla="*/ 235744 h 235744"/>
+                  <a:gd name="connsiteX3" fmla="*/ 102393 w 102393"/>
+                  <a:gd name="connsiteY3" fmla="*/ 171450 h 235744"/>
+                  <a:gd name="connsiteX4" fmla="*/ 47625 w 102393"/>
+                  <a:gd name="connsiteY4" fmla="*/ 0 h 235744"/>
+                </a:gdLst>
+                <a:ahLst/>
+                <a:cxnLst>
+                  <a:cxn ang="0">
+                    <a:pos x="connsiteX0" y="connsiteY0"/>
+                  </a:cxn>
+                  <a:cxn ang="0">
+                    <a:pos x="connsiteX1" y="connsiteY1"/>
+                  </a:cxn>
+                  <a:cxn ang="0">
+                    <a:pos x="connsiteX2" y="connsiteY2"/>
+                  </a:cxn>
+                  <a:cxn ang="0">
+                    <a:pos x="connsiteX3" y="connsiteY3"/>
+                  </a:cxn>
+                  <a:cxn ang="0">
+                    <a:pos x="connsiteX4" y="connsiteY4"/>
+                  </a:cxn>
+                </a:cxnLst>
+                <a:rect l="l" t="t" r="r" b="b"/>
+                <a:pathLst>
+                  <a:path w="102393" h="235744">
+                    <a:moveTo>
+                      <a:pt x="47625" y="0"/>
+                    </a:moveTo>
+                    <a:lnTo>
+                      <a:pt x="0" y="185738"/>
+                    </a:lnTo>
+                    <a:lnTo>
+                      <a:pt x="57150" y="235744"/>
+                    </a:lnTo>
+                    <a:lnTo>
+                      <a:pt x="102393" y="171450"/>
+                    </a:lnTo>
+                    <a:lnTo>
+                      <a:pt x="47625" y="0"/>
+                    </a:lnTo>
+                    <a:close/>
+                  </a:path>
+                </a:pathLst>
+              </a:custGeom>
+              <a:solidFill>
+                <a:schemeClr val="bg1"/>
+              </a:solidFill>
+            </p:spPr>
+            <p:style>
+              <a:lnRef idx="2">
+                <a:schemeClr val="accent1">
+                  <a:shade val="50000"/>
+                </a:schemeClr>
+              </a:lnRef>
+              <a:fillRef idx="1">
+                <a:schemeClr val="accent1"/>
+              </a:fillRef>
+              <a:effectRef idx="0">
+                <a:schemeClr val="accent1"/>
+              </a:effectRef>
+              <a:fontRef idx="minor">
+                <a:schemeClr val="lt1"/>
+              </a:fontRef>
+            </p:style>
+            <p:txBody>
+              <a:bodyPr rtlCol="0" anchor="ctr"/>
+              <a:lstStyle/>
+              <a:p>
+                <a:pPr algn="ctr"/>
+                <a:endParaRPr lang="en-SG"/>
+              </a:p>
+            </p:txBody>
+          </p:sp>
+        </p:grpSp>
+        <p:sp>
+          <p:nvSpPr>
+            <p:cNvPr id="13" name="Freeform 12"/>
+            <p:cNvSpPr/>
+            <p:nvPr/>
+          </p:nvSpPr>
+          <p:spPr>
+            <a:xfrm>
+              <a:off x="882472" y="469611"/>
+              <a:ext cx="50006" cy="19050"/>
+            </a:xfrm>
+            <a:custGeom>
+              <a:avLst/>
+              <a:gdLst>
+                <a:gd name="connsiteX0" fmla="*/ 0 w 50006"/>
+                <a:gd name="connsiteY0" fmla="*/ 0 h 19050"/>
+                <a:gd name="connsiteX1" fmla="*/ 0 w 50006"/>
+                <a:gd name="connsiteY1" fmla="*/ 0 h 19050"/>
+                <a:gd name="connsiteX2" fmla="*/ 21431 w 50006"/>
+                <a:gd name="connsiteY2" fmla="*/ 4762 h 19050"/>
+                <a:gd name="connsiteX3" fmla="*/ 28575 w 50006"/>
+                <a:gd name="connsiteY3" fmla="*/ 9525 h 19050"/>
+                <a:gd name="connsiteX4" fmla="*/ 38100 w 50006"/>
+                <a:gd name="connsiteY4" fmla="*/ 14287 h 19050"/>
+                <a:gd name="connsiteX5" fmla="*/ 50006 w 50006"/>
+                <a:gd name="connsiteY5" fmla="*/ 19050 h 19050"/>
+              </a:gdLst>
+              <a:ahLst/>
+              <a:cxnLst>
+                <a:cxn ang="0">
+                  <a:pos x="connsiteX0" y="connsiteY0"/>
+                </a:cxn>
+                <a:cxn ang="0">
+                  <a:pos x="connsiteX1" y="connsiteY1"/>
+                </a:cxn>
+                <a:cxn ang="0">
+                  <a:pos x="connsiteX2" y="connsiteY2"/>
+                </a:cxn>
+                <a:cxn ang="0">
+                  <a:pos x="connsiteX3" y="connsiteY3"/>
+                </a:cxn>
+                <a:cxn ang="0">
+                  <a:pos x="connsiteX4" y="connsiteY4"/>
+                </a:cxn>
+                <a:cxn ang="0">
+                  <a:pos x="connsiteX5" y="connsiteY5"/>
+                </a:cxn>
+              </a:cxnLst>
+              <a:rect l="l" t="t" r="r" b="b"/>
+              <a:pathLst>
+                <a:path w="50006" h="19050">
+                  <a:moveTo>
+                    <a:pt x="0" y="0"/>
+                  </a:moveTo>
+                  <a:lnTo>
+                    <a:pt x="0" y="0"/>
+                  </a:lnTo>
+                  <a:cubicBezTo>
+                    <a:pt x="7144" y="1587"/>
+                    <a:pt x="14489" y="2448"/>
+                    <a:pt x="21431" y="4762"/>
+                  </a:cubicBezTo>
+                  <a:cubicBezTo>
+                    <a:pt x="24146" y="5667"/>
+                    <a:pt x="26090" y="8105"/>
+                    <a:pt x="28575" y="9525"/>
+                  </a:cubicBezTo>
+                  <a:cubicBezTo>
+                    <a:pt x="31657" y="11286"/>
+                    <a:pt x="34837" y="12889"/>
+                    <a:pt x="38100" y="14287"/>
+                  </a:cubicBezTo>
+                  <a:cubicBezTo>
+                    <a:pt x="58672" y="23103"/>
+                    <a:pt x="34691" y="11391"/>
+                    <a:pt x="50006" y="19050"/>
+                  </a:cubicBezTo>
+                </a:path>
+              </a:pathLst>
+            </a:custGeom>
+            <a:solidFill>
+              <a:schemeClr val="bg1"/>
+            </a:solidFill>
+          </p:spPr>
+          <p:style>
+            <a:lnRef idx="2">
+              <a:schemeClr val="accent1">
+                <a:shade val="50000"/>
+              </a:schemeClr>
+            </a:lnRef>
+            <a:fillRef idx="1">
+              <a:schemeClr val="accent1"/>
+            </a:fillRef>
+            <a:effectRef idx="0">
+              <a:schemeClr val="accent1"/>
+            </a:effectRef>
+            <a:fontRef idx="minor">
+              <a:schemeClr val="lt1"/>
+            </a:fontRef>
+          </p:style>
+          <p:txBody>
+            <a:bodyPr rtlCol="0" anchor="ctr"/>
+            <a:lstStyle/>
+            <a:p>
+              <a:pPr algn="ctr"/>
+              <a:endParaRPr lang="en-SG"/>
+            </a:p>
+          </p:txBody>
+        </p:sp>
+        <p:sp>
+          <p:nvSpPr>
+            <p:cNvPr id="14" name="Flowchart: Connector 13"/>
+            <p:cNvSpPr/>
+            <p:nvPr/>
+          </p:nvSpPr>
+          <p:spPr>
+            <a:xfrm>
+              <a:off x="800257" y="354516"/>
+              <a:ext cx="45719" cy="45719"/>
+            </a:xfrm>
+            <a:prstGeom prst="flowChartConnector">
+              <a:avLst/>
+            </a:prstGeom>
+            <a:solidFill>
+              <a:schemeClr val="bg1"/>
+            </a:solidFill>
+            <a:ln>
+              <a:solidFill>
+                <a:schemeClr val="accent1">
+                  <a:lumMod val="75000"/>
+                </a:schemeClr>
+              </a:solidFill>
+            </a:ln>
+          </p:spPr>
+          <p:style>
+            <a:lnRef idx="2">
+              <a:schemeClr val="accent1">
+                <a:shade val="50000"/>
+              </a:schemeClr>
+            </a:lnRef>
+            <a:fillRef idx="1">
+              <a:schemeClr val="accent1"/>
+            </a:fillRef>
+            <a:effectRef idx="0">
+              <a:schemeClr val="accent1"/>
+            </a:effectRef>
+            <a:fontRef idx="minor">
+              <a:schemeClr val="lt1"/>
+            </a:fontRef>
+          </p:style>
+          <p:txBody>
+            <a:bodyPr rtlCol="0" anchor="ctr"/>
+            <a:lstStyle/>
+            <a:p>
+              <a:pPr algn="ctr"/>
+              <a:endParaRPr lang="en-SG"/>
+            </a:p>
+          </p:txBody>
+        </p:sp>
+      </p:grpSp>
     </p:spTree>
   </p:cSld>
   <p:clrMapOvr>

</xml_diff>